<commit_message>
Před první prezentací snad rdy
</commit_message>
<xml_diff>
--- a/source/files/Hnat_Zakopal_TPR_prezentace_1.pptx
+++ b/source/files/Hnat_Zakopal_TPR_prezentace_1.pptx
@@ -12114,7 +12114,7 @@
                 <a:latin typeface="Times New Roman" panose="02020603050405020304" pitchFamily="18" charset="0"/>
                 <a:cs typeface="Times New Roman" panose="02020603050405020304" pitchFamily="18" charset="0"/>
               </a:rPr>
-              <a:t>nové trendy „každý den“ – použitá technonolie první den může být už zastaralá</a:t>
+              <a:t>nové trendy „každý den“ – použitá technolie první den může být už zastaralá</a:t>
             </a:r>
           </a:p>
           <a:p>
@@ -12127,7 +12127,7 @@
                 <a:latin typeface="Times New Roman" panose="02020603050405020304" pitchFamily="18" charset="0"/>
                 <a:cs typeface="Times New Roman" panose="02020603050405020304" pitchFamily="18" charset="0"/>
               </a:rPr>
-              <a:t>analýza technologických novinek v zahrnaničí a implementace v tuzemsku &amp; vice versa</a:t>
+              <a:t>analýza technologických novinek v zahraničí a implementace v tuzemsku &amp; vice versa</a:t>
             </a:r>
           </a:p>
           <a:p>
@@ -12403,7 +12403,7 @@
                 <a:latin typeface="Times New Roman" panose="02020603050405020304" pitchFamily="18" charset="0"/>
                 <a:cs typeface="Times New Roman" panose="02020603050405020304" pitchFamily="18" charset="0"/>
               </a:rPr>
-              <a:t>sídlo v Čerské republice</a:t>
+              <a:t>sídlo v České republice</a:t>
             </a:r>
           </a:p>
           <a:p>

</xml_diff>